<commit_message>
API Firebase - Mobile
</commit_message>
<xml_diff>
--- a/doc technique/document-technique.pptx
+++ b/doc technique/document-technique.pptx
@@ -9,6 +9,8 @@
     <p:sldId id="259" r:id="rId3"/>
     <p:sldId id="258" r:id="rId4"/>
     <p:sldId id="257" r:id="rId5"/>
+    <p:sldId id="260" r:id="rId6"/>
+    <p:sldId id="261" r:id="rId7"/>
   </p:sldIdLst>
   <p:sldSz cx="12192000" cy="6858000"/>
   <p:notesSz cx="6858000" cy="9144000"/>
@@ -5949,7 +5951,7 @@
               <a:t>ETU003117 – KOTONIRINA Hardy </a:t>
             </a:r>
             <a:r>
-              <a:rPr lang="fr-FR"/>
+              <a:rPr lang="fr-FR" dirty="0" err="1"/>
               <a:t>Fleurys</a:t>
             </a:r>
             <a:endParaRPr lang="fr-FR" dirty="0"/>
@@ -6172,6 +6174,261 @@
     <p:extLst>
       <p:ext uri="{BB962C8B-B14F-4D97-AF65-F5344CB8AC3E}">
         <p14:creationId xmlns:p14="http://schemas.microsoft.com/office/powerpoint/2010/main" val="4211506282"/>
+      </p:ext>
+    </p:extLst>
+  </p:cSld>
+  <p:clrMapOvr>
+    <a:masterClrMapping/>
+  </p:clrMapOvr>
+</p:sld>
+</file>
+
+<file path=ppt/slides/slide5.xml><?xml version="1.0" encoding="utf-8"?>
+<p:sld xmlns:a="http://schemas.openxmlformats.org/drawingml/2006/main" xmlns:r="http://schemas.openxmlformats.org/officeDocument/2006/relationships" xmlns:p="http://schemas.openxmlformats.org/presentationml/2006/main">
+  <p:cSld>
+    <p:spTree>
+      <p:nvGrpSpPr>
+        <p:cNvPr id="1" name=""/>
+        <p:cNvGrpSpPr/>
+        <p:nvPr/>
+      </p:nvGrpSpPr>
+      <p:grpSpPr>
+        <a:xfrm>
+          <a:off x="0" y="0"/>
+          <a:ext cx="0" cy="0"/>
+          <a:chOff x="0" y="0"/>
+          <a:chExt cx="0" cy="0"/>
+        </a:xfrm>
+      </p:grpSpPr>
+      <p:sp>
+        <p:nvSpPr>
+          <p:cNvPr id="2" name="Titre 1">
+            <a:extLst>
+              <a:ext uri="{FF2B5EF4-FFF2-40B4-BE49-F238E27FC236}">
+                <a16:creationId xmlns:a16="http://schemas.microsoft.com/office/drawing/2014/main" id="{A4274A92-9880-E901-78B1-1C54ED3D6C52}"/>
+              </a:ext>
+            </a:extLst>
+          </p:cNvPr>
+          <p:cNvSpPr>
+            <a:spLocks noGrp="1"/>
+          </p:cNvSpPr>
+          <p:nvPr>
+            <p:ph type="title"/>
+          </p:nvPr>
+        </p:nvSpPr>
+        <p:spPr/>
+        <p:txBody>
+          <a:bodyPr/>
+          <a:lstStyle/>
+          <a:p>
+            <a:r>
+              <a:rPr lang="fr-FR" dirty="0"/>
+              <a:t>Scénario : Mobile – Visiteur sans compte</a:t>
+            </a:r>
+          </a:p>
+        </p:txBody>
+      </p:sp>
+      <p:sp>
+        <p:nvSpPr>
+          <p:cNvPr id="3" name="Espace réservé du contenu 2">
+            <a:extLst>
+              <a:ext uri="{FF2B5EF4-FFF2-40B4-BE49-F238E27FC236}">
+                <a16:creationId xmlns:a16="http://schemas.microsoft.com/office/drawing/2014/main" id="{FCFE0B20-ED58-5B2D-9155-26EA3679461F}"/>
+              </a:ext>
+            </a:extLst>
+          </p:cNvPr>
+          <p:cNvSpPr>
+            <a:spLocks noGrp="1"/>
+          </p:cNvSpPr>
+          <p:nvPr>
+            <p:ph idx="1"/>
+          </p:nvPr>
+        </p:nvSpPr>
+        <p:spPr>
+          <a:xfrm>
+            <a:off x="580619" y="1527543"/>
+            <a:ext cx="8596668" cy="468311"/>
+          </a:xfrm>
+        </p:spPr>
+        <p:txBody>
+          <a:bodyPr/>
+          <a:lstStyle/>
+          <a:p>
+            <a:r>
+              <a:rPr lang="fr-FR" dirty="0"/>
+              <a:t>Se connecter en tant que visiteur </a:t>
+            </a:r>
+          </a:p>
+        </p:txBody>
+      </p:sp>
+      <p:pic>
+        <p:nvPicPr>
+          <p:cNvPr id="5" name="Image 4">
+            <a:extLst>
+              <a:ext uri="{FF2B5EF4-FFF2-40B4-BE49-F238E27FC236}">
+                <a16:creationId xmlns:a16="http://schemas.microsoft.com/office/drawing/2014/main" id="{07EBBBA5-B425-BF88-D99F-D242C9B0196F}"/>
+              </a:ext>
+            </a:extLst>
+          </p:cNvPr>
+          <p:cNvPicPr>
+            <a:picLocks noChangeAspect="1"/>
+          </p:cNvPicPr>
+          <p:nvPr/>
+        </p:nvPicPr>
+        <p:blipFill>
+          <a:blip r:embed="rId2"/>
+          <a:stretch>
+            <a:fillRect/>
+          </a:stretch>
+        </p:blipFill>
+        <p:spPr>
+          <a:xfrm>
+            <a:off x="1907931" y="2189285"/>
+            <a:ext cx="7556019" cy="3731217"/>
+          </a:xfrm>
+          <a:prstGeom prst="rect">
+            <a:avLst/>
+          </a:prstGeom>
+        </p:spPr>
+      </p:pic>
+    </p:spTree>
+    <p:extLst>
+      <p:ext uri="{BB962C8B-B14F-4D97-AF65-F5344CB8AC3E}">
+        <p14:creationId xmlns:p14="http://schemas.microsoft.com/office/powerpoint/2010/main" val="3523361399"/>
+      </p:ext>
+    </p:extLst>
+  </p:cSld>
+  <p:clrMapOvr>
+    <a:masterClrMapping/>
+  </p:clrMapOvr>
+</p:sld>
+</file>
+
+<file path=ppt/slides/slide6.xml><?xml version="1.0" encoding="utf-8"?>
+<p:sld xmlns:a="http://schemas.openxmlformats.org/drawingml/2006/main" xmlns:r="http://schemas.openxmlformats.org/officeDocument/2006/relationships" xmlns:p="http://schemas.openxmlformats.org/presentationml/2006/main">
+  <p:cSld>
+    <p:spTree>
+      <p:nvGrpSpPr>
+        <p:cNvPr id="1" name=""/>
+        <p:cNvGrpSpPr/>
+        <p:nvPr/>
+      </p:nvGrpSpPr>
+      <p:grpSpPr>
+        <a:xfrm>
+          <a:off x="0" y="0"/>
+          <a:ext cx="0" cy="0"/>
+          <a:chOff x="0" y="0"/>
+          <a:chExt cx="0" cy="0"/>
+        </a:xfrm>
+      </p:grpSpPr>
+      <p:sp>
+        <p:nvSpPr>
+          <p:cNvPr id="2" name="Titre 1">
+            <a:extLst>
+              <a:ext uri="{FF2B5EF4-FFF2-40B4-BE49-F238E27FC236}">
+                <a16:creationId xmlns:a16="http://schemas.microsoft.com/office/drawing/2014/main" id="{B6540401-6CFD-BC3B-2463-FE606ACD7923}"/>
+              </a:ext>
+            </a:extLst>
+          </p:cNvPr>
+          <p:cNvSpPr>
+            <a:spLocks noGrp="1"/>
+          </p:cNvSpPr>
+          <p:nvPr>
+            <p:ph type="title"/>
+          </p:nvPr>
+        </p:nvSpPr>
+        <p:spPr>
+          <a:xfrm>
+            <a:off x="800426" y="310662"/>
+            <a:ext cx="8596668" cy="797169"/>
+          </a:xfrm>
+        </p:spPr>
+        <p:txBody>
+          <a:bodyPr/>
+          <a:lstStyle/>
+          <a:p>
+            <a:r>
+              <a:rPr lang="fr-FR" dirty="0"/>
+              <a:t>Scénario : Mobile – Visiteur sans compte</a:t>
+            </a:r>
+          </a:p>
+        </p:txBody>
+      </p:sp>
+      <p:sp>
+        <p:nvSpPr>
+          <p:cNvPr id="3" name="Espace réservé du contenu 2">
+            <a:extLst>
+              <a:ext uri="{FF2B5EF4-FFF2-40B4-BE49-F238E27FC236}">
+                <a16:creationId xmlns:a16="http://schemas.microsoft.com/office/drawing/2014/main" id="{BB76C891-9541-2C0D-B3E8-9D004344B820}"/>
+              </a:ext>
+            </a:extLst>
+          </p:cNvPr>
+          <p:cNvSpPr>
+            <a:spLocks noGrp="1"/>
+          </p:cNvSpPr>
+          <p:nvPr>
+            <p:ph idx="1"/>
+          </p:nvPr>
+        </p:nvSpPr>
+        <p:spPr>
+          <a:xfrm>
+            <a:off x="577506" y="1211378"/>
+            <a:ext cx="8596668" cy="1268411"/>
+          </a:xfrm>
+        </p:spPr>
+        <p:txBody>
+          <a:bodyPr>
+            <a:normAutofit lnSpcReduction="10000"/>
+          </a:bodyPr>
+          <a:lstStyle/>
+          <a:p>
+            <a:r>
+              <a:rPr lang="fr-FR" dirty="0"/>
+              <a:t>Le visiteur peut voir la carte avec les différents points représentants les problèmes routiers</a:t>
+            </a:r>
+          </a:p>
+          <a:p>
+            <a:r>
+              <a:rPr lang="fr-FR" dirty="0"/>
+              <a:t>En cliquant sur un signalement, il peut voir les différents détails de ce problème routier</a:t>
+            </a:r>
+          </a:p>
+        </p:txBody>
+      </p:sp>
+      <p:pic>
+        <p:nvPicPr>
+          <p:cNvPr id="5" name="Image 4">
+            <a:extLst>
+              <a:ext uri="{FF2B5EF4-FFF2-40B4-BE49-F238E27FC236}">
+                <a16:creationId xmlns:a16="http://schemas.microsoft.com/office/drawing/2014/main" id="{C90F963F-E565-62A9-6C76-3DBFF84EC53D}"/>
+              </a:ext>
+            </a:extLst>
+          </p:cNvPr>
+          <p:cNvPicPr>
+            <a:picLocks noChangeAspect="1"/>
+          </p:cNvPicPr>
+          <p:nvPr/>
+        </p:nvPicPr>
+        <p:blipFill>
+          <a:blip r:embed="rId2"/>
+          <a:stretch>
+            <a:fillRect/>
+          </a:stretch>
+        </p:blipFill>
+        <p:spPr>
+          <a:xfrm>
+            <a:off x="3508098" y="2404559"/>
+            <a:ext cx="8435461" cy="4142779"/>
+          </a:xfrm>
+          <a:prstGeom prst="rect">
+            <a:avLst/>
+          </a:prstGeom>
+        </p:spPr>
+      </p:pic>
+    </p:spTree>
+    <p:extLst>
+      <p:ext uri="{BB962C8B-B14F-4D97-AF65-F5344CB8AC3E}">
+        <p14:creationId xmlns:p14="http://schemas.microsoft.com/office/powerpoint/2010/main" val="2345705364"/>
       </p:ext>
     </p:extLst>
   </p:cSld>

</xml_diff>